<commit_message>
Update blur and recolor all except selected icons
</commit_message>
<xml_diff>
--- a/doc/Icons-EffectsLab.pptx
+++ b/doc/Icons-EffectsLab.pptx
@@ -5157,7 +5157,7 @@
               <a:solidFill>
                 <a:schemeClr val="bg1"/>
               </a:solidFill>
-              <a:ln w="19050">
+              <a:ln w="38100">
                 <a:solidFill>
                   <a:schemeClr val="bg1"/>
                 </a:solidFill>
@@ -5603,7 +5603,7 @@
               <a:solidFill>
                 <a:schemeClr val="bg1"/>
               </a:solidFill>
-              <a:ln w="19050">
+              <a:ln w="38100">
                 <a:solidFill>
                   <a:schemeClr val="bg1"/>
                 </a:solidFill>
@@ -7141,7 +7141,7 @@
               <a:lstStyle/>
               <a:p>
                 <a:pPr algn="ctr"/>
-                <a:endParaRPr lang="en-US"/>
+                <a:endParaRPr lang="en-US" dirty="0"/>
               </a:p>
             </p:txBody>
           </p:sp>
@@ -7345,7 +7345,7 @@
               <a:solidFill>
                 <a:schemeClr val="bg1"/>
               </a:solidFill>
-              <a:ln w="19050">
+              <a:ln w="38100">
                 <a:solidFill>
                   <a:schemeClr val="bg1"/>
                 </a:solidFill>
@@ -7469,210 +7469,6 @@
           </a:p>
         </p:txBody>
       </p:sp>
-      <p:grpSp>
-        <p:nvGrpSpPr>
-          <p:cNvPr id="22" name="Group 21">
-            <a:extLst>
-              <a:ext uri="{FF2B5EF4-FFF2-40B4-BE49-F238E27FC236}">
-                <a16:creationId xmlns:a16="http://schemas.microsoft.com/office/drawing/2014/main" id="{DF0D7395-3403-4556-ABA9-9161337D7406}"/>
-              </a:ext>
-            </a:extLst>
-          </p:cNvPr>
-          <p:cNvGrpSpPr/>
-          <p:nvPr/>
-        </p:nvGrpSpPr>
-        <p:grpSpPr>
-          <a:xfrm>
-            <a:off x="6578999" y="4429109"/>
-            <a:ext cx="420624" cy="420624"/>
-            <a:chOff x="6578999" y="4429109"/>
-            <a:chExt cx="420624" cy="420624"/>
-          </a:xfrm>
-        </p:grpSpPr>
-        <p:sp>
-          <p:nvSpPr>
-            <p:cNvPr id="298" name="Rectangle 297">
-              <a:extLst>
-                <a:ext uri="{FF2B5EF4-FFF2-40B4-BE49-F238E27FC236}">
-                  <a16:creationId xmlns:a16="http://schemas.microsoft.com/office/drawing/2014/main" id="{6F977185-BBC8-4F8B-A69E-114B85B69665}"/>
-                </a:ext>
-              </a:extLst>
-            </p:cNvPr>
-            <p:cNvSpPr/>
-            <p:nvPr/>
-          </p:nvSpPr>
-          <p:spPr>
-            <a:xfrm>
-              <a:off x="6578999" y="4429109"/>
-              <a:ext cx="420624" cy="420624"/>
-            </a:xfrm>
-            <a:prstGeom prst="rect">
-              <a:avLst/>
-            </a:prstGeom>
-            <a:noFill/>
-            <a:ln>
-              <a:noFill/>
-            </a:ln>
-          </p:spPr>
-          <p:style>
-            <a:lnRef idx="2">
-              <a:schemeClr val="accent1">
-                <a:shade val="50000"/>
-              </a:schemeClr>
-            </a:lnRef>
-            <a:fillRef idx="1">
-              <a:schemeClr val="accent1"/>
-            </a:fillRef>
-            <a:effectRef idx="0">
-              <a:schemeClr val="accent1"/>
-            </a:effectRef>
-            <a:fontRef idx="minor">
-              <a:schemeClr val="lt1"/>
-            </a:fontRef>
-          </p:style>
-          <p:txBody>
-            <a:bodyPr rtlCol="0" anchor="ctr"/>
-            <a:lstStyle/>
-            <a:p>
-              <a:pPr algn="ctr"/>
-              <a:endParaRPr lang="en-US"/>
-            </a:p>
-          </p:txBody>
-        </p:sp>
-        <p:pic>
-          <p:nvPicPr>
-            <p:cNvPr id="300" name="Picture 2">
-              <a:extLst>
-                <a:ext uri="{FF2B5EF4-FFF2-40B4-BE49-F238E27FC236}">
-                  <a16:creationId xmlns:a16="http://schemas.microsoft.com/office/drawing/2014/main" id="{6640A6A6-0F2B-4CD9-AFDB-E0A09100F4DC}"/>
-                </a:ext>
-              </a:extLst>
-            </p:cNvPr>
-            <p:cNvPicPr>
-              <a:picLocks noChangeAspect="1" noChangeArrowheads="1"/>
-            </p:cNvPicPr>
-            <p:nvPr/>
-          </p:nvPicPr>
-          <p:blipFill>
-            <a:blip r:embed="rId3">
-              <a:extLst>
-                <a:ext uri="{BEBA8EAE-BF5A-486C-A8C5-ECC9F3942E4B}">
-                  <a14:imgProps xmlns:a14="http://schemas.microsoft.com/office/drawing/2010/main">
-                    <a14:imgLayer r:embed="rId4">
-                      <a14:imgEffect>
-                        <a14:artisticBlur/>
-                      </a14:imgEffect>
-                    </a14:imgLayer>
-                  </a14:imgProps>
-                </a:ext>
-                <a:ext uri="{28A0092B-C50C-407E-A947-70E740481C1C}">
-                  <a14:useLocalDpi xmlns:a14="http://schemas.microsoft.com/office/drawing/2010/main" val="0"/>
-                </a:ext>
-              </a:extLst>
-            </a:blip>
-            <a:srcRect/>
-            <a:stretch>
-              <a:fillRect/>
-            </a:stretch>
-          </p:blipFill>
-          <p:spPr bwMode="auto">
-            <a:xfrm>
-              <a:off x="6582133" y="4433271"/>
-              <a:ext cx="414337" cy="414337"/>
-            </a:xfrm>
-            <a:prstGeom prst="rect">
-              <a:avLst/>
-            </a:prstGeom>
-            <a:noFill/>
-            <a:ln>
-              <a:noFill/>
-            </a:ln>
-            <a:effectLst/>
-            <a:extLst>
-              <a:ext uri="{909E8E84-426E-40DD-AFC4-6F175D3DCCD1}">
-                <a14:hiddenFill xmlns:a14="http://schemas.microsoft.com/office/drawing/2010/main">
-                  <a:solidFill>
-                    <a:schemeClr val="accent1"/>
-                  </a:solidFill>
-                </a14:hiddenFill>
-              </a:ext>
-              <a:ext uri="{91240B29-F687-4F45-9708-019B960494DF}">
-                <a14:hiddenLine xmlns:a14="http://schemas.microsoft.com/office/drawing/2010/main" w="9525">
-                  <a:solidFill>
-                    <a:schemeClr val="tx1"/>
-                  </a:solidFill>
-                  <a:miter lim="800000"/>
-                  <a:headEnd/>
-                  <a:tailEnd/>
-                </a14:hiddenLine>
-              </a:ext>
-              <a:ext uri="{AF507438-7753-43E0-B8FC-AC1667EBCBE1}">
-                <a14:hiddenEffects xmlns:a14="http://schemas.microsoft.com/office/drawing/2010/main">
-                  <a:effectLst>
-                    <a:outerShdw dist="35921" dir="2700000" algn="ctr" rotWithShape="0">
-                      <a:schemeClr val="bg2"/>
-                    </a:outerShdw>
-                  </a:effectLst>
-                </a14:hiddenEffects>
-              </a:ext>
-            </a:extLst>
-          </p:spPr>
-        </p:pic>
-        <p:sp>
-          <p:nvSpPr>
-            <p:cNvPr id="308" name="Isosceles Triangle 307">
-              <a:extLst>
-                <a:ext uri="{FF2B5EF4-FFF2-40B4-BE49-F238E27FC236}">
-                  <a16:creationId xmlns:a16="http://schemas.microsoft.com/office/drawing/2014/main" id="{F6834B1D-8762-4876-8DB6-631FC8725051}"/>
-                </a:ext>
-              </a:extLst>
-            </p:cNvPr>
-            <p:cNvSpPr/>
-            <p:nvPr/>
-          </p:nvSpPr>
-          <p:spPr>
-            <a:xfrm>
-              <a:off x="6644123" y="4504848"/>
-              <a:ext cx="303120" cy="236323"/>
-            </a:xfrm>
-            <a:prstGeom prst="triangle">
-              <a:avLst/>
-            </a:prstGeom>
-            <a:solidFill>
-              <a:srgbClr val="0070C0"/>
-            </a:solidFill>
-            <a:ln w="9525">
-              <a:solidFill>
-                <a:schemeClr val="bg1"/>
-              </a:solidFill>
-            </a:ln>
-          </p:spPr>
-          <p:style>
-            <a:lnRef idx="2">
-              <a:schemeClr val="accent1">
-                <a:shade val="50000"/>
-              </a:schemeClr>
-            </a:lnRef>
-            <a:fillRef idx="1">
-              <a:schemeClr val="accent1"/>
-            </a:fillRef>
-            <a:effectRef idx="0">
-              <a:schemeClr val="accent1"/>
-            </a:effectRef>
-            <a:fontRef idx="minor">
-              <a:schemeClr val="lt1"/>
-            </a:fontRef>
-          </p:style>
-          <p:txBody>
-            <a:bodyPr rtlCol="0" anchor="ctr"/>
-            <a:lstStyle/>
-            <a:p>
-              <a:pPr algn="ctr"/>
-              <a:endParaRPr lang="en-US"/>
-            </a:p>
-          </p:txBody>
-        </p:sp>
-      </p:grpSp>
       <p:sp>
         <p:nvSpPr>
           <p:cNvPr id="323" name="[TextBox 40]">
@@ -7711,10 +7507,10 @@
       </p:sp>
       <p:grpSp>
         <p:nvGrpSpPr>
-          <p:cNvPr id="20" name="Group 164">
+          <p:cNvPr id="5" name="Group 4">
             <a:extLst>
               <a:ext uri="{FF2B5EF4-FFF2-40B4-BE49-F238E27FC236}">
-                <a16:creationId xmlns:a16="http://schemas.microsoft.com/office/drawing/2014/main" id="{E3A35B4A-CCC8-4127-8C9F-E0F7D709C377}"/>
+                <a16:creationId xmlns:a16="http://schemas.microsoft.com/office/drawing/2014/main" id="{1E14584E-CA9F-4F64-A9B4-202988B678EC}"/>
               </a:ext>
             </a:extLst>
           </p:cNvPr>
@@ -7723,545 +7519,771 @@
         </p:nvGrpSpPr>
         <p:grpSpPr>
           <a:xfrm>
-            <a:off x="7878454" y="4429109"/>
-            <a:ext cx="420624" cy="420624"/>
-            <a:chOff x="7874178" y="4429109"/>
-            <a:chExt cx="420624" cy="420624"/>
+            <a:off x="7826074" y="4278688"/>
+            <a:ext cx="473004" cy="707886"/>
+            <a:chOff x="7826074" y="4278688"/>
+            <a:chExt cx="473004" cy="707886"/>
           </a:xfrm>
         </p:grpSpPr>
-        <p:sp>
-          <p:nvSpPr>
-            <p:cNvPr id="350" name="Rectangle 349">
+        <p:grpSp>
+          <p:nvGrpSpPr>
+            <p:cNvPr id="20" name="Group 164">
               <a:extLst>
                 <a:ext uri="{FF2B5EF4-FFF2-40B4-BE49-F238E27FC236}">
-                  <a16:creationId xmlns:a16="http://schemas.microsoft.com/office/drawing/2014/main" id="{78BC657B-4CD0-46E2-8A91-883A72386DCB}"/>
+                  <a16:creationId xmlns:a16="http://schemas.microsoft.com/office/drawing/2014/main" id="{E3A35B4A-CCC8-4127-8C9F-E0F7D709C377}"/>
                 </a:ext>
               </a:extLst>
             </p:cNvPr>
-            <p:cNvSpPr/>
+            <p:cNvGrpSpPr/>
+            <p:nvPr/>
+          </p:nvGrpSpPr>
+          <p:grpSpPr>
+            <a:xfrm>
+              <a:off x="7878454" y="4429109"/>
+              <a:ext cx="420624" cy="420624"/>
+              <a:chOff x="7874178" y="4429109"/>
+              <a:chExt cx="420624" cy="420624"/>
+            </a:xfrm>
+          </p:grpSpPr>
+          <p:sp>
+            <p:nvSpPr>
+              <p:cNvPr id="350" name="Rectangle 349">
+                <a:extLst>
+                  <a:ext uri="{FF2B5EF4-FFF2-40B4-BE49-F238E27FC236}">
+                    <a16:creationId xmlns:a16="http://schemas.microsoft.com/office/drawing/2014/main" id="{78BC657B-4CD0-46E2-8A91-883A72386DCB}"/>
+                  </a:ext>
+                </a:extLst>
+              </p:cNvPr>
+              <p:cNvSpPr/>
+              <p:nvPr/>
+            </p:nvSpPr>
+            <p:spPr>
+              <a:xfrm>
+                <a:off x="7874178" y="4429109"/>
+                <a:ext cx="420624" cy="420624"/>
+              </a:xfrm>
+              <a:prstGeom prst="rect">
+                <a:avLst/>
+              </a:prstGeom>
+              <a:noFill/>
+              <a:ln>
+                <a:noFill/>
+              </a:ln>
+            </p:spPr>
+            <p:style>
+              <a:lnRef idx="2">
+                <a:schemeClr val="accent1">
+                  <a:shade val="50000"/>
+                </a:schemeClr>
+              </a:lnRef>
+              <a:fillRef idx="1">
+                <a:schemeClr val="accent1"/>
+              </a:fillRef>
+              <a:effectRef idx="0">
+                <a:schemeClr val="accent1"/>
+              </a:effectRef>
+              <a:fontRef idx="minor">
+                <a:schemeClr val="lt1"/>
+              </a:fontRef>
+            </p:style>
+            <p:txBody>
+              <a:bodyPr rtlCol="0" anchor="ctr"/>
+              <a:lstStyle/>
+              <a:p>
+                <a:pPr algn="ctr"/>
+                <a:endParaRPr lang="en-US"/>
+              </a:p>
+            </p:txBody>
+          </p:sp>
+          <p:sp>
+            <p:nvSpPr>
+              <p:cNvPr id="351" name="Rectangle 350">
+                <a:extLst>
+                  <a:ext uri="{FF2B5EF4-FFF2-40B4-BE49-F238E27FC236}">
+                    <a16:creationId xmlns:a16="http://schemas.microsoft.com/office/drawing/2014/main" id="{E18156AB-6425-4B19-88A9-D622B6F15FD7}"/>
+                  </a:ext>
+                </a:extLst>
+              </p:cNvPr>
+              <p:cNvSpPr/>
+              <p:nvPr/>
+            </p:nvSpPr>
+            <p:spPr>
+              <a:xfrm>
+                <a:off x="7878749" y="4431146"/>
+                <a:ext cx="108342" cy="118491"/>
+              </a:xfrm>
+              <a:prstGeom prst="rect">
+                <a:avLst/>
+              </a:prstGeom>
+              <a:solidFill>
+                <a:schemeClr val="bg1">
+                  <a:lumMod val="50000"/>
+                </a:schemeClr>
+              </a:solidFill>
+              <a:ln>
+                <a:noFill/>
+              </a:ln>
+            </p:spPr>
+            <p:style>
+              <a:lnRef idx="2">
+                <a:schemeClr val="accent1">
+                  <a:shade val="50000"/>
+                </a:schemeClr>
+              </a:lnRef>
+              <a:fillRef idx="1">
+                <a:schemeClr val="accent1"/>
+              </a:fillRef>
+              <a:effectRef idx="0">
+                <a:schemeClr val="accent1"/>
+              </a:effectRef>
+              <a:fontRef idx="minor">
+                <a:schemeClr val="lt1"/>
+              </a:fontRef>
+            </p:style>
+            <p:txBody>
+              <a:bodyPr rtlCol="0" anchor="ctr"/>
+              <a:lstStyle/>
+              <a:p>
+                <a:pPr algn="ctr"/>
+                <a:endParaRPr lang="en-US"/>
+              </a:p>
+            </p:txBody>
+          </p:sp>
+          <p:sp>
+            <p:nvSpPr>
+              <p:cNvPr id="352" name="Rectangle 351">
+                <a:extLst>
+                  <a:ext uri="{FF2B5EF4-FFF2-40B4-BE49-F238E27FC236}">
+                    <a16:creationId xmlns:a16="http://schemas.microsoft.com/office/drawing/2014/main" id="{56490092-86F0-4271-B776-6EE7F592E5CD}"/>
+                  </a:ext>
+                </a:extLst>
+              </p:cNvPr>
+              <p:cNvSpPr/>
+              <p:nvPr/>
+            </p:nvSpPr>
+            <p:spPr>
+              <a:xfrm>
+                <a:off x="8080193" y="4431146"/>
+                <a:ext cx="108342" cy="118491"/>
+              </a:xfrm>
+              <a:prstGeom prst="rect">
+                <a:avLst/>
+              </a:prstGeom>
+              <a:solidFill>
+                <a:schemeClr val="bg1">
+                  <a:lumMod val="50000"/>
+                </a:schemeClr>
+              </a:solidFill>
+              <a:ln>
+                <a:noFill/>
+              </a:ln>
+            </p:spPr>
+            <p:style>
+              <a:lnRef idx="2">
+                <a:schemeClr val="accent1">
+                  <a:shade val="50000"/>
+                </a:schemeClr>
+              </a:lnRef>
+              <a:fillRef idx="1">
+                <a:schemeClr val="accent1"/>
+              </a:fillRef>
+              <a:effectRef idx="0">
+                <a:schemeClr val="accent1"/>
+              </a:effectRef>
+              <a:fontRef idx="minor">
+                <a:schemeClr val="lt1"/>
+              </a:fontRef>
+            </p:style>
+            <p:txBody>
+              <a:bodyPr rtlCol="0" anchor="ctr"/>
+              <a:lstStyle/>
+              <a:p>
+                <a:pPr algn="ctr"/>
+                <a:endParaRPr lang="en-US"/>
+              </a:p>
+            </p:txBody>
+          </p:sp>
+          <p:sp>
+            <p:nvSpPr>
+              <p:cNvPr id="353" name="Rectangle 352">
+                <a:extLst>
+                  <a:ext uri="{FF2B5EF4-FFF2-40B4-BE49-F238E27FC236}">
+                    <a16:creationId xmlns:a16="http://schemas.microsoft.com/office/drawing/2014/main" id="{D31C09D4-4C2E-4063-88B4-CEFB9265FAA2}"/>
+                  </a:ext>
+                </a:extLst>
+              </p:cNvPr>
+              <p:cNvSpPr/>
+              <p:nvPr/>
+            </p:nvSpPr>
+            <p:spPr>
+              <a:xfrm>
+                <a:off x="7980424" y="4547505"/>
+                <a:ext cx="108342" cy="118491"/>
+              </a:xfrm>
+              <a:prstGeom prst="rect">
+                <a:avLst/>
+              </a:prstGeom>
+              <a:solidFill>
+                <a:schemeClr val="bg1">
+                  <a:lumMod val="50000"/>
+                </a:schemeClr>
+              </a:solidFill>
+              <a:ln>
+                <a:noFill/>
+              </a:ln>
+            </p:spPr>
+            <p:style>
+              <a:lnRef idx="2">
+                <a:schemeClr val="accent1">
+                  <a:shade val="50000"/>
+                </a:schemeClr>
+              </a:lnRef>
+              <a:fillRef idx="1">
+                <a:schemeClr val="accent1"/>
+              </a:fillRef>
+              <a:effectRef idx="0">
+                <a:schemeClr val="accent1"/>
+              </a:effectRef>
+              <a:fontRef idx="minor">
+                <a:schemeClr val="lt1"/>
+              </a:fontRef>
+            </p:style>
+            <p:txBody>
+              <a:bodyPr rtlCol="0" anchor="ctr"/>
+              <a:lstStyle/>
+              <a:p>
+                <a:pPr algn="ctr"/>
+                <a:endParaRPr lang="en-US"/>
+              </a:p>
+            </p:txBody>
+          </p:sp>
+          <p:sp>
+            <p:nvSpPr>
+              <p:cNvPr id="354" name="Rectangle 353">
+                <a:extLst>
+                  <a:ext uri="{FF2B5EF4-FFF2-40B4-BE49-F238E27FC236}">
+                    <a16:creationId xmlns:a16="http://schemas.microsoft.com/office/drawing/2014/main" id="{F8185A2C-AE4C-4468-86F0-40968368639A}"/>
+                  </a:ext>
+                </a:extLst>
+              </p:cNvPr>
+              <p:cNvSpPr/>
+              <p:nvPr/>
+            </p:nvSpPr>
+            <p:spPr>
+              <a:xfrm>
+                <a:off x="8181869" y="4547505"/>
+                <a:ext cx="108342" cy="118491"/>
+              </a:xfrm>
+              <a:prstGeom prst="rect">
+                <a:avLst/>
+              </a:prstGeom>
+              <a:solidFill>
+                <a:schemeClr val="bg1">
+                  <a:lumMod val="50000"/>
+                </a:schemeClr>
+              </a:solidFill>
+              <a:ln>
+                <a:noFill/>
+              </a:ln>
+            </p:spPr>
+            <p:style>
+              <a:lnRef idx="2">
+                <a:schemeClr val="accent1">
+                  <a:shade val="50000"/>
+                </a:schemeClr>
+              </a:lnRef>
+              <a:fillRef idx="1">
+                <a:schemeClr val="accent1"/>
+              </a:fillRef>
+              <a:effectRef idx="0">
+                <a:schemeClr val="accent1"/>
+              </a:effectRef>
+              <a:fontRef idx="minor">
+                <a:schemeClr val="lt1"/>
+              </a:fontRef>
+            </p:style>
+            <p:txBody>
+              <a:bodyPr rtlCol="0" anchor="ctr"/>
+              <a:lstStyle/>
+              <a:p>
+                <a:pPr algn="ctr"/>
+                <a:endParaRPr lang="en-US"/>
+              </a:p>
+            </p:txBody>
+          </p:sp>
+          <p:sp>
+            <p:nvSpPr>
+              <p:cNvPr id="355" name="Rectangle 354">
+                <a:extLst>
+                  <a:ext uri="{FF2B5EF4-FFF2-40B4-BE49-F238E27FC236}">
+                    <a16:creationId xmlns:a16="http://schemas.microsoft.com/office/drawing/2014/main" id="{4221896B-1D85-433E-A206-6EE058180CFE}"/>
+                  </a:ext>
+                </a:extLst>
+              </p:cNvPr>
+              <p:cNvSpPr/>
+              <p:nvPr/>
+            </p:nvSpPr>
+            <p:spPr>
+              <a:xfrm>
+                <a:off x="7878749" y="4662551"/>
+                <a:ext cx="108342" cy="118491"/>
+              </a:xfrm>
+              <a:prstGeom prst="rect">
+                <a:avLst/>
+              </a:prstGeom>
+              <a:solidFill>
+                <a:schemeClr val="bg1">
+                  <a:lumMod val="50000"/>
+                </a:schemeClr>
+              </a:solidFill>
+              <a:ln>
+                <a:noFill/>
+              </a:ln>
+            </p:spPr>
+            <p:style>
+              <a:lnRef idx="2">
+                <a:schemeClr val="accent1">
+                  <a:shade val="50000"/>
+                </a:schemeClr>
+              </a:lnRef>
+              <a:fillRef idx="1">
+                <a:schemeClr val="accent1"/>
+              </a:fillRef>
+              <a:effectRef idx="0">
+                <a:schemeClr val="accent1"/>
+              </a:effectRef>
+              <a:fontRef idx="minor">
+                <a:schemeClr val="lt1"/>
+              </a:fontRef>
+            </p:style>
+            <p:txBody>
+              <a:bodyPr rtlCol="0" anchor="ctr"/>
+              <a:lstStyle/>
+              <a:p>
+                <a:pPr algn="ctr"/>
+                <a:endParaRPr lang="en-US"/>
+              </a:p>
+            </p:txBody>
+          </p:sp>
+          <p:sp>
+            <p:nvSpPr>
+              <p:cNvPr id="356" name="Rectangle 355">
+                <a:extLst>
+                  <a:ext uri="{FF2B5EF4-FFF2-40B4-BE49-F238E27FC236}">
+                    <a16:creationId xmlns:a16="http://schemas.microsoft.com/office/drawing/2014/main" id="{F23D1333-5709-44DD-9BD8-FD12DE146220}"/>
+                  </a:ext>
+                </a:extLst>
+              </p:cNvPr>
+              <p:cNvSpPr/>
+              <p:nvPr/>
+            </p:nvSpPr>
+            <p:spPr>
+              <a:xfrm>
+                <a:off x="8080193" y="4662551"/>
+                <a:ext cx="108342" cy="118491"/>
+              </a:xfrm>
+              <a:prstGeom prst="rect">
+                <a:avLst/>
+              </a:prstGeom>
+              <a:solidFill>
+                <a:schemeClr val="bg1">
+                  <a:lumMod val="50000"/>
+                </a:schemeClr>
+              </a:solidFill>
+              <a:ln>
+                <a:noFill/>
+              </a:ln>
+            </p:spPr>
+            <p:style>
+              <a:lnRef idx="2">
+                <a:schemeClr val="accent1">
+                  <a:shade val="50000"/>
+                </a:schemeClr>
+              </a:lnRef>
+              <a:fillRef idx="1">
+                <a:schemeClr val="accent1"/>
+              </a:fillRef>
+              <a:effectRef idx="0">
+                <a:schemeClr val="accent1"/>
+              </a:effectRef>
+              <a:fontRef idx="minor">
+                <a:schemeClr val="lt1"/>
+              </a:fontRef>
+            </p:style>
+            <p:txBody>
+              <a:bodyPr rtlCol="0" anchor="ctr"/>
+              <a:lstStyle/>
+              <a:p>
+                <a:pPr algn="ctr"/>
+                <a:endParaRPr lang="en-US"/>
+              </a:p>
+            </p:txBody>
+          </p:sp>
+          <p:sp>
+            <p:nvSpPr>
+              <p:cNvPr id="357" name="Rectangle 356">
+                <a:extLst>
+                  <a:ext uri="{FF2B5EF4-FFF2-40B4-BE49-F238E27FC236}">
+                    <a16:creationId xmlns:a16="http://schemas.microsoft.com/office/drawing/2014/main" id="{84BA9686-9D20-4103-B8BB-095D4718CC1E}"/>
+                  </a:ext>
+                </a:extLst>
+              </p:cNvPr>
+              <p:cNvSpPr/>
+              <p:nvPr/>
+            </p:nvSpPr>
+            <p:spPr>
+              <a:xfrm>
+                <a:off x="7980424" y="4778910"/>
+                <a:ext cx="108342" cy="70823"/>
+              </a:xfrm>
+              <a:prstGeom prst="rect">
+                <a:avLst/>
+              </a:prstGeom>
+              <a:solidFill>
+                <a:schemeClr val="bg1">
+                  <a:lumMod val="50000"/>
+                </a:schemeClr>
+              </a:solidFill>
+              <a:ln>
+                <a:noFill/>
+              </a:ln>
+            </p:spPr>
+            <p:style>
+              <a:lnRef idx="2">
+                <a:schemeClr val="accent1">
+                  <a:shade val="50000"/>
+                </a:schemeClr>
+              </a:lnRef>
+              <a:fillRef idx="1">
+                <a:schemeClr val="accent1"/>
+              </a:fillRef>
+              <a:effectRef idx="0">
+                <a:schemeClr val="accent1"/>
+              </a:effectRef>
+              <a:fontRef idx="minor">
+                <a:schemeClr val="lt1"/>
+              </a:fontRef>
+            </p:style>
+            <p:txBody>
+              <a:bodyPr rtlCol="0" anchor="ctr"/>
+              <a:lstStyle/>
+              <a:p>
+                <a:pPr algn="ctr"/>
+                <a:endParaRPr lang="en-US"/>
+              </a:p>
+            </p:txBody>
+          </p:sp>
+          <p:sp>
+            <p:nvSpPr>
+              <p:cNvPr id="358" name="Rectangle 357">
+                <a:extLst>
+                  <a:ext uri="{FF2B5EF4-FFF2-40B4-BE49-F238E27FC236}">
+                    <a16:creationId xmlns:a16="http://schemas.microsoft.com/office/drawing/2014/main" id="{F5FABB54-E25F-4EDA-A58C-F88F84BAE918}"/>
+                  </a:ext>
+                </a:extLst>
+              </p:cNvPr>
+              <p:cNvSpPr/>
+              <p:nvPr/>
+            </p:nvSpPr>
+            <p:spPr>
+              <a:xfrm>
+                <a:off x="8181869" y="4778910"/>
+                <a:ext cx="108342" cy="70823"/>
+              </a:xfrm>
+              <a:prstGeom prst="rect">
+                <a:avLst/>
+              </a:prstGeom>
+              <a:solidFill>
+                <a:schemeClr val="bg1">
+                  <a:lumMod val="50000"/>
+                </a:schemeClr>
+              </a:solidFill>
+              <a:ln>
+                <a:noFill/>
+              </a:ln>
+            </p:spPr>
+            <p:style>
+              <a:lnRef idx="2">
+                <a:schemeClr val="accent1">
+                  <a:shade val="50000"/>
+                </a:schemeClr>
+              </a:lnRef>
+              <a:fillRef idx="1">
+                <a:schemeClr val="accent1"/>
+              </a:fillRef>
+              <a:effectRef idx="0">
+                <a:schemeClr val="accent1"/>
+              </a:effectRef>
+              <a:fontRef idx="minor">
+                <a:schemeClr val="lt1"/>
+              </a:fontRef>
+            </p:style>
+            <p:txBody>
+              <a:bodyPr rtlCol="0" anchor="ctr"/>
+              <a:lstStyle/>
+              <a:p>
+                <a:pPr algn="ctr"/>
+                <a:endParaRPr lang="en-US"/>
+              </a:p>
+            </p:txBody>
+          </p:sp>
+        </p:grpSp>
+        <p:sp>
+          <p:nvSpPr>
+            <p:cNvPr id="2" name="TextBox 1">
+              <a:extLst>
+                <a:ext uri="{FF2B5EF4-FFF2-40B4-BE49-F238E27FC236}">
+                  <a16:creationId xmlns:a16="http://schemas.microsoft.com/office/drawing/2014/main" id="{83D9BB43-7931-4194-83A8-A1BA928FA1A6}"/>
+                </a:ext>
+              </a:extLst>
+            </p:cNvPr>
+            <p:cNvSpPr txBox="1"/>
             <p:nvPr/>
           </p:nvSpPr>
           <p:spPr>
             <a:xfrm>
-              <a:off x="7874178" y="4429109"/>
-              <a:ext cx="420624" cy="420624"/>
+              <a:off x="7826074" y="4278688"/>
+              <a:ext cx="377994" cy="707886"/>
             </a:xfrm>
             <a:prstGeom prst="rect">
               <a:avLst/>
             </a:prstGeom>
             <a:noFill/>
-            <a:ln>
-              <a:noFill/>
-            </a:ln>
           </p:spPr>
-          <p:style>
-            <a:lnRef idx="2">
-              <a:schemeClr val="accent1">
-                <a:shade val="50000"/>
-              </a:schemeClr>
-            </a:lnRef>
-            <a:fillRef idx="1">
-              <a:schemeClr val="accent1"/>
-            </a:fillRef>
-            <a:effectRef idx="0">
-              <a:schemeClr val="accent1"/>
-            </a:effectRef>
-            <a:fontRef idx="minor">
-              <a:schemeClr val="lt1"/>
-            </a:fontRef>
-          </p:style>
           <p:txBody>
-            <a:bodyPr rtlCol="0" anchor="ctr"/>
+            <a:bodyPr wrap="square" rtlCol="0">
+              <a:spAutoFit/>
+            </a:bodyPr>
             <a:lstStyle/>
             <a:p>
-              <a:pPr algn="ctr"/>
-              <a:endParaRPr lang="en-US"/>
+              <a:r>
+                <a:rPr lang="en-US" sz="4000" b="1" dirty="0">
+                  <a:ln w="19050">
+                    <a:solidFill>
+                      <a:schemeClr val="bg1"/>
+                    </a:solidFill>
+                  </a:ln>
+                  <a:solidFill>
+                    <a:srgbClr val="0070C0"/>
+                  </a:solidFill>
+                </a:rPr>
+                <a:t>O</a:t>
+              </a:r>
             </a:p>
           </p:txBody>
         </p:sp>
-        <p:sp>
-          <p:nvSpPr>
-            <p:cNvPr id="351" name="Rectangle 350">
+      </p:grpSp>
+      <p:grpSp>
+        <p:nvGrpSpPr>
+          <p:cNvPr id="3" name="Group 2">
+            <a:extLst>
+              <a:ext uri="{FF2B5EF4-FFF2-40B4-BE49-F238E27FC236}">
+                <a16:creationId xmlns:a16="http://schemas.microsoft.com/office/drawing/2014/main" id="{8EE74EFE-628C-4442-8817-B24E327B470D}"/>
+              </a:ext>
+            </a:extLst>
+          </p:cNvPr>
+          <p:cNvGrpSpPr/>
+          <p:nvPr/>
+        </p:nvGrpSpPr>
+        <p:grpSpPr>
+          <a:xfrm>
+            <a:off x="6532742" y="4279209"/>
+            <a:ext cx="476094" cy="707886"/>
+            <a:chOff x="6532742" y="4279209"/>
+            <a:chExt cx="476094" cy="707886"/>
+          </a:xfrm>
+        </p:grpSpPr>
+        <p:grpSp>
+          <p:nvGrpSpPr>
+            <p:cNvPr id="22" name="Group 21">
               <a:extLst>
                 <a:ext uri="{FF2B5EF4-FFF2-40B4-BE49-F238E27FC236}">
-                  <a16:creationId xmlns:a16="http://schemas.microsoft.com/office/drawing/2014/main" id="{E18156AB-6425-4B19-88A9-D622B6F15FD7}"/>
+                  <a16:creationId xmlns:a16="http://schemas.microsoft.com/office/drawing/2014/main" id="{DF0D7395-3403-4556-ABA9-9161337D7406}"/>
                 </a:ext>
               </a:extLst>
             </p:cNvPr>
-            <p:cNvSpPr/>
+            <p:cNvGrpSpPr/>
+            <p:nvPr/>
+          </p:nvGrpSpPr>
+          <p:grpSpPr>
+            <a:xfrm>
+              <a:off x="6578999" y="4429109"/>
+              <a:ext cx="420624" cy="420624"/>
+              <a:chOff x="6578999" y="4429109"/>
+              <a:chExt cx="420624" cy="420624"/>
+            </a:xfrm>
+          </p:grpSpPr>
+          <p:sp>
+            <p:nvSpPr>
+              <p:cNvPr id="298" name="Rectangle 297">
+                <a:extLst>
+                  <a:ext uri="{FF2B5EF4-FFF2-40B4-BE49-F238E27FC236}">
+                    <a16:creationId xmlns:a16="http://schemas.microsoft.com/office/drawing/2014/main" id="{6F977185-BBC8-4F8B-A69E-114B85B69665}"/>
+                  </a:ext>
+                </a:extLst>
+              </p:cNvPr>
+              <p:cNvSpPr/>
+              <p:nvPr/>
+            </p:nvSpPr>
+            <p:spPr>
+              <a:xfrm>
+                <a:off x="6578999" y="4429109"/>
+                <a:ext cx="420624" cy="420624"/>
+              </a:xfrm>
+              <a:prstGeom prst="rect">
+                <a:avLst/>
+              </a:prstGeom>
+              <a:noFill/>
+              <a:ln>
+                <a:noFill/>
+              </a:ln>
+            </p:spPr>
+            <p:style>
+              <a:lnRef idx="2">
+                <a:schemeClr val="accent1">
+                  <a:shade val="50000"/>
+                </a:schemeClr>
+              </a:lnRef>
+              <a:fillRef idx="1">
+                <a:schemeClr val="accent1"/>
+              </a:fillRef>
+              <a:effectRef idx="0">
+                <a:schemeClr val="accent1"/>
+              </a:effectRef>
+              <a:fontRef idx="minor">
+                <a:schemeClr val="lt1"/>
+              </a:fontRef>
+            </p:style>
+            <p:txBody>
+              <a:bodyPr rtlCol="0" anchor="ctr"/>
+              <a:lstStyle/>
+              <a:p>
+                <a:pPr algn="ctr"/>
+                <a:endParaRPr lang="en-US"/>
+              </a:p>
+            </p:txBody>
+          </p:sp>
+          <p:pic>
+            <p:nvPicPr>
+              <p:cNvPr id="300" name="Picture 2">
+                <a:extLst>
+                  <a:ext uri="{FF2B5EF4-FFF2-40B4-BE49-F238E27FC236}">
+                    <a16:creationId xmlns:a16="http://schemas.microsoft.com/office/drawing/2014/main" id="{6640A6A6-0F2B-4CD9-AFDB-E0A09100F4DC}"/>
+                  </a:ext>
+                </a:extLst>
+              </p:cNvPr>
+              <p:cNvPicPr>
+                <a:picLocks noChangeAspect="1" noChangeArrowheads="1"/>
+              </p:cNvPicPr>
+              <p:nvPr/>
+            </p:nvPicPr>
+            <p:blipFill>
+              <a:blip r:embed="rId3">
+                <a:extLst>
+                  <a:ext uri="{BEBA8EAE-BF5A-486C-A8C5-ECC9F3942E4B}">
+                    <a14:imgProps xmlns:a14="http://schemas.microsoft.com/office/drawing/2010/main">
+                      <a14:imgLayer r:embed="rId4">
+                        <a14:imgEffect>
+                          <a14:artisticBlur/>
+                        </a14:imgEffect>
+                      </a14:imgLayer>
+                    </a14:imgProps>
+                  </a:ext>
+                  <a:ext uri="{28A0092B-C50C-407E-A947-70E740481C1C}">
+                    <a14:useLocalDpi xmlns:a14="http://schemas.microsoft.com/office/drawing/2010/main" val="0"/>
+                  </a:ext>
+                </a:extLst>
+              </a:blip>
+              <a:srcRect/>
+              <a:stretch>
+                <a:fillRect/>
+              </a:stretch>
+            </p:blipFill>
+            <p:spPr bwMode="auto">
+              <a:xfrm>
+                <a:off x="6582133" y="4433271"/>
+                <a:ext cx="414337" cy="414337"/>
+              </a:xfrm>
+              <a:prstGeom prst="rect">
+                <a:avLst/>
+              </a:prstGeom>
+              <a:noFill/>
+              <a:ln>
+                <a:noFill/>
+              </a:ln>
+              <a:effectLst/>
+              <a:extLst>
+                <a:ext uri="{909E8E84-426E-40DD-AFC4-6F175D3DCCD1}">
+                  <a14:hiddenFill xmlns:a14="http://schemas.microsoft.com/office/drawing/2010/main">
+                    <a:solidFill>
+                      <a:schemeClr val="accent1"/>
+                    </a:solidFill>
+                  </a14:hiddenFill>
+                </a:ext>
+                <a:ext uri="{91240B29-F687-4F45-9708-019B960494DF}">
+                  <a14:hiddenLine xmlns:a14="http://schemas.microsoft.com/office/drawing/2010/main" w="9525">
+                    <a:solidFill>
+                      <a:schemeClr val="tx1"/>
+                    </a:solidFill>
+                    <a:miter lim="800000"/>
+                    <a:headEnd/>
+                    <a:tailEnd/>
+                  </a14:hiddenLine>
+                </a:ext>
+                <a:ext uri="{AF507438-7753-43E0-B8FC-AC1667EBCBE1}">
+                  <a14:hiddenEffects xmlns:a14="http://schemas.microsoft.com/office/drawing/2010/main">
+                    <a:effectLst>
+                      <a:outerShdw dist="35921" dir="2700000" algn="ctr" rotWithShape="0">
+                        <a:schemeClr val="bg2"/>
+                      </a:outerShdw>
+                    </a:effectLst>
+                  </a14:hiddenEffects>
+                </a:ext>
+              </a:extLst>
+            </p:spPr>
+          </p:pic>
+        </p:grpSp>
+        <p:sp>
+          <p:nvSpPr>
+            <p:cNvPr id="98" name="TextBox 97">
+              <a:extLst>
+                <a:ext uri="{FF2B5EF4-FFF2-40B4-BE49-F238E27FC236}">
+                  <a16:creationId xmlns:a16="http://schemas.microsoft.com/office/drawing/2014/main" id="{7C48DAA5-D2F8-4CBD-AF0D-2C6D1C31D7BE}"/>
+                </a:ext>
+              </a:extLst>
+            </p:cNvPr>
+            <p:cNvSpPr txBox="1"/>
             <p:nvPr/>
           </p:nvSpPr>
           <p:spPr>
             <a:xfrm>
-              <a:off x="7878749" y="4431146"/>
-              <a:ext cx="108342" cy="118491"/>
+              <a:off x="6532742" y="4279209"/>
+              <a:ext cx="476094" cy="707886"/>
             </a:xfrm>
             <a:prstGeom prst="rect">
               <a:avLst/>
             </a:prstGeom>
-            <a:solidFill>
-              <a:schemeClr val="bg1">
-                <a:lumMod val="50000"/>
-              </a:schemeClr>
-            </a:solidFill>
-            <a:ln>
-              <a:noFill/>
-            </a:ln>
+            <a:noFill/>
           </p:spPr>
-          <p:style>
-            <a:lnRef idx="2">
-              <a:schemeClr val="accent1">
-                <a:shade val="50000"/>
-              </a:schemeClr>
-            </a:lnRef>
-            <a:fillRef idx="1">
-              <a:schemeClr val="accent1"/>
-            </a:fillRef>
-            <a:effectRef idx="0">
-              <a:schemeClr val="accent1"/>
-            </a:effectRef>
-            <a:fontRef idx="minor">
-              <a:schemeClr val="lt1"/>
-            </a:fontRef>
-          </p:style>
           <p:txBody>
-            <a:bodyPr rtlCol="0" anchor="ctr"/>
+            <a:bodyPr wrap="square" rtlCol="0">
+              <a:spAutoFit/>
+            </a:bodyPr>
             <a:lstStyle/>
             <a:p>
-              <a:pPr algn="ctr"/>
-              <a:endParaRPr lang="en-US"/>
-            </a:p>
-          </p:txBody>
-        </p:sp>
-        <p:sp>
-          <p:nvSpPr>
-            <p:cNvPr id="352" name="Rectangle 351">
-              <a:extLst>
-                <a:ext uri="{FF2B5EF4-FFF2-40B4-BE49-F238E27FC236}">
-                  <a16:creationId xmlns:a16="http://schemas.microsoft.com/office/drawing/2014/main" id="{56490092-86F0-4271-B776-6EE7F592E5CD}"/>
-                </a:ext>
-              </a:extLst>
-            </p:cNvPr>
-            <p:cNvSpPr/>
-            <p:nvPr/>
-          </p:nvSpPr>
-          <p:spPr>
-            <a:xfrm>
-              <a:off x="8080193" y="4431146"/>
-              <a:ext cx="108342" cy="118491"/>
-            </a:xfrm>
-            <a:prstGeom prst="rect">
-              <a:avLst/>
-            </a:prstGeom>
-            <a:solidFill>
-              <a:schemeClr val="bg1">
-                <a:lumMod val="50000"/>
-              </a:schemeClr>
-            </a:solidFill>
-            <a:ln>
-              <a:noFill/>
-            </a:ln>
-          </p:spPr>
-          <p:style>
-            <a:lnRef idx="2">
-              <a:schemeClr val="accent1">
-                <a:shade val="50000"/>
-              </a:schemeClr>
-            </a:lnRef>
-            <a:fillRef idx="1">
-              <a:schemeClr val="accent1"/>
-            </a:fillRef>
-            <a:effectRef idx="0">
-              <a:schemeClr val="accent1"/>
-            </a:effectRef>
-            <a:fontRef idx="minor">
-              <a:schemeClr val="lt1"/>
-            </a:fontRef>
-          </p:style>
-          <p:txBody>
-            <a:bodyPr rtlCol="0" anchor="ctr"/>
-            <a:lstStyle/>
-            <a:p>
-              <a:pPr algn="ctr"/>
-              <a:endParaRPr lang="en-US"/>
-            </a:p>
-          </p:txBody>
-        </p:sp>
-        <p:sp>
-          <p:nvSpPr>
-            <p:cNvPr id="353" name="Rectangle 352">
-              <a:extLst>
-                <a:ext uri="{FF2B5EF4-FFF2-40B4-BE49-F238E27FC236}">
-                  <a16:creationId xmlns:a16="http://schemas.microsoft.com/office/drawing/2014/main" id="{D31C09D4-4C2E-4063-88B4-CEFB9265FAA2}"/>
-                </a:ext>
-              </a:extLst>
-            </p:cNvPr>
-            <p:cNvSpPr/>
-            <p:nvPr/>
-          </p:nvSpPr>
-          <p:spPr>
-            <a:xfrm>
-              <a:off x="7980424" y="4547505"/>
-              <a:ext cx="108342" cy="118491"/>
-            </a:xfrm>
-            <a:prstGeom prst="rect">
-              <a:avLst/>
-            </a:prstGeom>
-            <a:solidFill>
-              <a:schemeClr val="bg1">
-                <a:lumMod val="50000"/>
-              </a:schemeClr>
-            </a:solidFill>
-            <a:ln>
-              <a:noFill/>
-            </a:ln>
-          </p:spPr>
-          <p:style>
-            <a:lnRef idx="2">
-              <a:schemeClr val="accent1">
-                <a:shade val="50000"/>
-              </a:schemeClr>
-            </a:lnRef>
-            <a:fillRef idx="1">
-              <a:schemeClr val="accent1"/>
-            </a:fillRef>
-            <a:effectRef idx="0">
-              <a:schemeClr val="accent1"/>
-            </a:effectRef>
-            <a:fontRef idx="minor">
-              <a:schemeClr val="lt1"/>
-            </a:fontRef>
-          </p:style>
-          <p:txBody>
-            <a:bodyPr rtlCol="0" anchor="ctr"/>
-            <a:lstStyle/>
-            <a:p>
-              <a:pPr algn="ctr"/>
-              <a:endParaRPr lang="en-US"/>
-            </a:p>
-          </p:txBody>
-        </p:sp>
-        <p:sp>
-          <p:nvSpPr>
-            <p:cNvPr id="354" name="Rectangle 353">
-              <a:extLst>
-                <a:ext uri="{FF2B5EF4-FFF2-40B4-BE49-F238E27FC236}">
-                  <a16:creationId xmlns:a16="http://schemas.microsoft.com/office/drawing/2014/main" id="{F8185A2C-AE4C-4468-86F0-40968368639A}"/>
-                </a:ext>
-              </a:extLst>
-            </p:cNvPr>
-            <p:cNvSpPr/>
-            <p:nvPr/>
-          </p:nvSpPr>
-          <p:spPr>
-            <a:xfrm>
-              <a:off x="8181869" y="4547505"/>
-              <a:ext cx="108342" cy="118491"/>
-            </a:xfrm>
-            <a:prstGeom prst="rect">
-              <a:avLst/>
-            </a:prstGeom>
-            <a:solidFill>
-              <a:schemeClr val="bg1">
-                <a:lumMod val="50000"/>
-              </a:schemeClr>
-            </a:solidFill>
-            <a:ln>
-              <a:noFill/>
-            </a:ln>
-          </p:spPr>
-          <p:style>
-            <a:lnRef idx="2">
-              <a:schemeClr val="accent1">
-                <a:shade val="50000"/>
-              </a:schemeClr>
-            </a:lnRef>
-            <a:fillRef idx="1">
-              <a:schemeClr val="accent1"/>
-            </a:fillRef>
-            <a:effectRef idx="0">
-              <a:schemeClr val="accent1"/>
-            </a:effectRef>
-            <a:fontRef idx="minor">
-              <a:schemeClr val="lt1"/>
-            </a:fontRef>
-          </p:style>
-          <p:txBody>
-            <a:bodyPr rtlCol="0" anchor="ctr"/>
-            <a:lstStyle/>
-            <a:p>
-              <a:pPr algn="ctr"/>
-              <a:endParaRPr lang="en-US"/>
-            </a:p>
-          </p:txBody>
-        </p:sp>
-        <p:sp>
-          <p:nvSpPr>
-            <p:cNvPr id="355" name="Rectangle 354">
-              <a:extLst>
-                <a:ext uri="{FF2B5EF4-FFF2-40B4-BE49-F238E27FC236}">
-                  <a16:creationId xmlns:a16="http://schemas.microsoft.com/office/drawing/2014/main" id="{4221896B-1D85-433E-A206-6EE058180CFE}"/>
-                </a:ext>
-              </a:extLst>
-            </p:cNvPr>
-            <p:cNvSpPr/>
-            <p:nvPr/>
-          </p:nvSpPr>
-          <p:spPr>
-            <a:xfrm>
-              <a:off x="7878749" y="4662551"/>
-              <a:ext cx="108342" cy="118491"/>
-            </a:xfrm>
-            <a:prstGeom prst="rect">
-              <a:avLst/>
-            </a:prstGeom>
-            <a:solidFill>
-              <a:schemeClr val="bg1">
-                <a:lumMod val="50000"/>
-              </a:schemeClr>
-            </a:solidFill>
-            <a:ln>
-              <a:noFill/>
-            </a:ln>
-          </p:spPr>
-          <p:style>
-            <a:lnRef idx="2">
-              <a:schemeClr val="accent1">
-                <a:shade val="50000"/>
-              </a:schemeClr>
-            </a:lnRef>
-            <a:fillRef idx="1">
-              <a:schemeClr val="accent1"/>
-            </a:fillRef>
-            <a:effectRef idx="0">
-              <a:schemeClr val="accent1"/>
-            </a:effectRef>
-            <a:fontRef idx="minor">
-              <a:schemeClr val="lt1"/>
-            </a:fontRef>
-          </p:style>
-          <p:txBody>
-            <a:bodyPr rtlCol="0" anchor="ctr"/>
-            <a:lstStyle/>
-            <a:p>
-              <a:pPr algn="ctr"/>
-              <a:endParaRPr lang="en-US"/>
-            </a:p>
-          </p:txBody>
-        </p:sp>
-        <p:sp>
-          <p:nvSpPr>
-            <p:cNvPr id="356" name="Rectangle 355">
-              <a:extLst>
-                <a:ext uri="{FF2B5EF4-FFF2-40B4-BE49-F238E27FC236}">
-                  <a16:creationId xmlns:a16="http://schemas.microsoft.com/office/drawing/2014/main" id="{F23D1333-5709-44DD-9BD8-FD12DE146220}"/>
-                </a:ext>
-              </a:extLst>
-            </p:cNvPr>
-            <p:cNvSpPr/>
-            <p:nvPr/>
-          </p:nvSpPr>
-          <p:spPr>
-            <a:xfrm>
-              <a:off x="8080193" y="4662551"/>
-              <a:ext cx="108342" cy="118491"/>
-            </a:xfrm>
-            <a:prstGeom prst="rect">
-              <a:avLst/>
-            </a:prstGeom>
-            <a:solidFill>
-              <a:schemeClr val="bg1">
-                <a:lumMod val="50000"/>
-              </a:schemeClr>
-            </a:solidFill>
-            <a:ln>
-              <a:noFill/>
-            </a:ln>
-          </p:spPr>
-          <p:style>
-            <a:lnRef idx="2">
-              <a:schemeClr val="accent1">
-                <a:shade val="50000"/>
-              </a:schemeClr>
-            </a:lnRef>
-            <a:fillRef idx="1">
-              <a:schemeClr val="accent1"/>
-            </a:fillRef>
-            <a:effectRef idx="0">
-              <a:schemeClr val="accent1"/>
-            </a:effectRef>
-            <a:fontRef idx="minor">
-              <a:schemeClr val="lt1"/>
-            </a:fontRef>
-          </p:style>
-          <p:txBody>
-            <a:bodyPr rtlCol="0" anchor="ctr"/>
-            <a:lstStyle/>
-            <a:p>
-              <a:pPr algn="ctr"/>
-              <a:endParaRPr lang="en-US"/>
-            </a:p>
-          </p:txBody>
-        </p:sp>
-        <p:sp>
-          <p:nvSpPr>
-            <p:cNvPr id="357" name="Rectangle 356">
-              <a:extLst>
-                <a:ext uri="{FF2B5EF4-FFF2-40B4-BE49-F238E27FC236}">
-                  <a16:creationId xmlns:a16="http://schemas.microsoft.com/office/drawing/2014/main" id="{84BA9686-9D20-4103-B8BB-095D4718CC1E}"/>
-                </a:ext>
-              </a:extLst>
-            </p:cNvPr>
-            <p:cNvSpPr/>
-            <p:nvPr/>
-          </p:nvSpPr>
-          <p:spPr>
-            <a:xfrm>
-              <a:off x="7980424" y="4778910"/>
-              <a:ext cx="108342" cy="70823"/>
-            </a:xfrm>
-            <a:prstGeom prst="rect">
-              <a:avLst/>
-            </a:prstGeom>
-            <a:solidFill>
-              <a:schemeClr val="bg1">
-                <a:lumMod val="50000"/>
-              </a:schemeClr>
-            </a:solidFill>
-            <a:ln>
-              <a:noFill/>
-            </a:ln>
-          </p:spPr>
-          <p:style>
-            <a:lnRef idx="2">
-              <a:schemeClr val="accent1">
-                <a:shade val="50000"/>
-              </a:schemeClr>
-            </a:lnRef>
-            <a:fillRef idx="1">
-              <a:schemeClr val="accent1"/>
-            </a:fillRef>
-            <a:effectRef idx="0">
-              <a:schemeClr val="accent1"/>
-            </a:effectRef>
-            <a:fontRef idx="minor">
-              <a:schemeClr val="lt1"/>
-            </a:fontRef>
-          </p:style>
-          <p:txBody>
-            <a:bodyPr rtlCol="0" anchor="ctr"/>
-            <a:lstStyle/>
-            <a:p>
-              <a:pPr algn="ctr"/>
-              <a:endParaRPr lang="en-US"/>
-            </a:p>
-          </p:txBody>
-        </p:sp>
-        <p:sp>
-          <p:nvSpPr>
-            <p:cNvPr id="358" name="Rectangle 357">
-              <a:extLst>
-                <a:ext uri="{FF2B5EF4-FFF2-40B4-BE49-F238E27FC236}">
-                  <a16:creationId xmlns:a16="http://schemas.microsoft.com/office/drawing/2014/main" id="{F5FABB54-E25F-4EDA-A58C-F88F84BAE918}"/>
-                </a:ext>
-              </a:extLst>
-            </p:cNvPr>
-            <p:cNvSpPr/>
-            <p:nvPr/>
-          </p:nvSpPr>
-          <p:spPr>
-            <a:xfrm>
-              <a:off x="8181869" y="4778910"/>
-              <a:ext cx="108342" cy="70823"/>
-            </a:xfrm>
-            <a:prstGeom prst="rect">
-              <a:avLst/>
-            </a:prstGeom>
-            <a:solidFill>
-              <a:schemeClr val="bg1">
-                <a:lumMod val="50000"/>
-              </a:schemeClr>
-            </a:solidFill>
-            <a:ln>
-              <a:noFill/>
-            </a:ln>
-          </p:spPr>
-          <p:style>
-            <a:lnRef idx="2">
-              <a:schemeClr val="accent1">
-                <a:shade val="50000"/>
-              </a:schemeClr>
-            </a:lnRef>
-            <a:fillRef idx="1">
-              <a:schemeClr val="accent1"/>
-            </a:fillRef>
-            <a:effectRef idx="0">
-              <a:schemeClr val="accent1"/>
-            </a:effectRef>
-            <a:fontRef idx="minor">
-              <a:schemeClr val="lt1"/>
-            </a:fontRef>
-          </p:style>
-          <p:txBody>
-            <a:bodyPr rtlCol="0" anchor="ctr"/>
-            <a:lstStyle/>
-            <a:p>
-              <a:pPr algn="ctr"/>
-              <a:endParaRPr lang="en-US"/>
-            </a:p>
-          </p:txBody>
-        </p:sp>
-        <p:sp>
-          <p:nvSpPr>
-            <p:cNvPr id="360" name="Isosceles Triangle 359">
-              <a:extLst>
-                <a:ext uri="{FF2B5EF4-FFF2-40B4-BE49-F238E27FC236}">
-                  <a16:creationId xmlns:a16="http://schemas.microsoft.com/office/drawing/2014/main" id="{7FFB758C-9A2B-4303-9151-75FA7724E8D8}"/>
-                </a:ext>
-              </a:extLst>
-            </p:cNvPr>
-            <p:cNvSpPr/>
-            <p:nvPr/>
-          </p:nvSpPr>
-          <p:spPr>
-            <a:xfrm>
-              <a:off x="7937693" y="4498377"/>
-              <a:ext cx="303120" cy="236323"/>
-            </a:xfrm>
-            <a:prstGeom prst="triangle">
-              <a:avLst/>
-            </a:prstGeom>
-            <a:solidFill>
-              <a:srgbClr val="0070C0"/>
-            </a:solidFill>
-            <a:ln w="9525">
-              <a:solidFill>
-                <a:schemeClr val="bg1"/>
-              </a:solidFill>
-            </a:ln>
-          </p:spPr>
-          <p:style>
-            <a:lnRef idx="2">
-              <a:schemeClr val="accent1">
-                <a:shade val="50000"/>
-              </a:schemeClr>
-            </a:lnRef>
-            <a:fillRef idx="1">
-              <a:schemeClr val="accent1"/>
-            </a:fillRef>
-            <a:effectRef idx="0">
-              <a:schemeClr val="accent1"/>
-            </a:effectRef>
-            <a:fontRef idx="minor">
-              <a:schemeClr val="lt1"/>
-            </a:fontRef>
-          </p:style>
-          <p:txBody>
-            <a:bodyPr rtlCol="0" anchor="ctr"/>
-            <a:lstStyle/>
-            <a:p>
-              <a:pPr algn="ctr"/>
-              <a:endParaRPr lang="en-US"/>
+              <a:r>
+                <a:rPr lang="en-US" sz="4000" b="1" dirty="0">
+                  <a:ln w="19050">
+                    <a:solidFill>
+                      <a:schemeClr val="bg1"/>
+                    </a:solidFill>
+                  </a:ln>
+                  <a:solidFill>
+                    <a:srgbClr val="0070C0"/>
+                  </a:solidFill>
+                </a:rPr>
+                <a:t>O</a:t>
+              </a:r>
             </a:p>
           </p:txBody>
         </p:sp>

</xml_diff>

<commit_message>
Update Blur and Recolor Background icons
</commit_message>
<xml_diff>
--- a/doc/Icons-EffectsLab.pptx
+++ b/doc/Icons-EffectsLab.pptx
@@ -19,6 +19,13 @@
       <p:bold r:id="rId5"/>
       <p:italic r:id="rId6"/>
       <p:boldItalic r:id="rId7"/>
+    </p:embeddedFont>
+    <p:embeddedFont>
+      <p:font typeface="Tw Cen MT" panose="020B0602020104020603" pitchFamily="34" charset="0"/>
+      <p:regular r:id="rId8"/>
+      <p:bold r:id="rId9"/>
+      <p:italic r:id="rId10"/>
+      <p:boldItalic r:id="rId11"/>
     </p:embeddedFont>
   </p:embeddedFontLst>
   <p:defaultTextStyle>
@@ -221,7 +228,7 @@
           <a:p>
             <a:fld id="{6699ACB9-486C-4D62-A3A7-AF98E13EFDA3}" type="datetimeFigureOut">
               <a:rPr lang="en-US" smtClean="0"/>
-              <a:t>7/4/2017</a:t>
+              <a:t>7/5/2017</a:t>
             </a:fld>
             <a:endParaRPr lang="en-US"/>
           </a:p>
@@ -752,7 +759,7 @@
             <a:fld id="{1D8BD707-D9CF-40AE-B4C6-C98DA3205C09}" type="datetimeFigureOut">
               <a:rPr lang="en-US" smtClean="0"/>
               <a:pPr/>
-              <a:t>7/4/2017</a:t>
+              <a:t>7/5/2017</a:t>
             </a:fld>
             <a:endParaRPr lang="en-US"/>
           </a:p>
@@ -917,7 +924,7 @@
             <a:fld id="{1D8BD707-D9CF-40AE-B4C6-C98DA3205C09}" type="datetimeFigureOut">
               <a:rPr lang="en-US" smtClean="0"/>
               <a:pPr/>
-              <a:t>7/4/2017</a:t>
+              <a:t>7/5/2017</a:t>
             </a:fld>
             <a:endParaRPr lang="en-US"/>
           </a:p>
@@ -1092,7 +1099,7 @@
             <a:fld id="{1D8BD707-D9CF-40AE-B4C6-C98DA3205C09}" type="datetimeFigureOut">
               <a:rPr lang="en-US" smtClean="0"/>
               <a:pPr/>
-              <a:t>7/4/2017</a:t>
+              <a:t>7/5/2017</a:t>
             </a:fld>
             <a:endParaRPr lang="en-US"/>
           </a:p>
@@ -1257,7 +1264,7 @@
             <a:fld id="{1D8BD707-D9CF-40AE-B4C6-C98DA3205C09}" type="datetimeFigureOut">
               <a:rPr lang="en-US" smtClean="0"/>
               <a:pPr/>
-              <a:t>7/4/2017</a:t>
+              <a:t>7/5/2017</a:t>
             </a:fld>
             <a:endParaRPr lang="en-US"/>
           </a:p>
@@ -1499,7 +1506,7 @@
             <a:fld id="{1D8BD707-D9CF-40AE-B4C6-C98DA3205C09}" type="datetimeFigureOut">
               <a:rPr lang="en-US" smtClean="0"/>
               <a:pPr/>
-              <a:t>7/4/2017</a:t>
+              <a:t>7/5/2017</a:t>
             </a:fld>
             <a:endParaRPr lang="en-US"/>
           </a:p>
@@ -1781,7 +1788,7 @@
             <a:fld id="{1D8BD707-D9CF-40AE-B4C6-C98DA3205C09}" type="datetimeFigureOut">
               <a:rPr lang="en-US" smtClean="0"/>
               <a:pPr/>
-              <a:t>7/4/2017</a:t>
+              <a:t>7/5/2017</a:t>
             </a:fld>
             <a:endParaRPr lang="en-US"/>
           </a:p>
@@ -2197,7 +2204,7 @@
             <a:fld id="{1D8BD707-D9CF-40AE-B4C6-C98DA3205C09}" type="datetimeFigureOut">
               <a:rPr lang="en-US" smtClean="0"/>
               <a:pPr/>
-              <a:t>7/4/2017</a:t>
+              <a:t>7/5/2017</a:t>
             </a:fld>
             <a:endParaRPr lang="en-US"/>
           </a:p>
@@ -2311,7 +2318,7 @@
             <a:fld id="{1D8BD707-D9CF-40AE-B4C6-C98DA3205C09}" type="datetimeFigureOut">
               <a:rPr lang="en-US" smtClean="0"/>
               <a:pPr/>
-              <a:t>7/4/2017</a:t>
+              <a:t>7/5/2017</a:t>
             </a:fld>
             <a:endParaRPr lang="en-US"/>
           </a:p>
@@ -2403,7 +2410,7 @@
             <a:fld id="{1D8BD707-D9CF-40AE-B4C6-C98DA3205C09}" type="datetimeFigureOut">
               <a:rPr lang="en-US" smtClean="0"/>
               <a:pPr/>
-              <a:t>7/4/2017</a:t>
+              <a:t>7/5/2017</a:t>
             </a:fld>
             <a:endParaRPr lang="en-US"/>
           </a:p>
@@ -2675,7 +2682,7 @@
             <a:fld id="{1D8BD707-D9CF-40AE-B4C6-C98DA3205C09}" type="datetimeFigureOut">
               <a:rPr lang="en-US" smtClean="0"/>
               <a:pPr/>
-              <a:t>7/4/2017</a:t>
+              <a:t>7/5/2017</a:t>
             </a:fld>
             <a:endParaRPr lang="en-US"/>
           </a:p>
@@ -2924,7 +2931,7 @@
             <a:fld id="{1D8BD707-D9CF-40AE-B4C6-C98DA3205C09}" type="datetimeFigureOut">
               <a:rPr lang="en-US" smtClean="0"/>
               <a:pPr/>
-              <a:t>7/4/2017</a:t>
+              <a:t>7/5/2017</a:t>
             </a:fld>
             <a:endParaRPr lang="en-US"/>
           </a:p>
@@ -3132,7 +3139,7 @@
             <a:fld id="{1D8BD707-D9CF-40AE-B4C6-C98DA3205C09}" type="datetimeFigureOut">
               <a:rPr lang="en-US" smtClean="0"/>
               <a:pPr/>
-              <a:t>7/4/2017</a:t>
+              <a:t>7/5/2017</a:t>
             </a:fld>
             <a:endParaRPr lang="en-US"/>
           </a:p>
@@ -7519,10 +7526,10 @@
         </p:nvGrpSpPr>
         <p:grpSpPr>
           <a:xfrm>
-            <a:off x="7826074" y="4278688"/>
-            <a:ext cx="473004" cy="707886"/>
-            <a:chOff x="7826074" y="4278688"/>
-            <a:chExt cx="473004" cy="707886"/>
+            <a:off x="7811481" y="4273824"/>
+            <a:ext cx="487597" cy="707886"/>
+            <a:chOff x="7811481" y="4273824"/>
+            <a:chExt cx="487597" cy="707886"/>
           </a:xfrm>
         </p:grpSpPr>
         <p:grpSp>
@@ -8042,8 +8049,8 @@
           </p:nvSpPr>
           <p:spPr>
             <a:xfrm>
-              <a:off x="7826074" y="4278688"/>
-              <a:ext cx="377994" cy="707886"/>
+              <a:off x="7811481" y="4273824"/>
+              <a:ext cx="478729" cy="707886"/>
             </a:xfrm>
             <a:prstGeom prst="rect">
               <a:avLst/>
@@ -8066,6 +8073,7 @@
                   <a:solidFill>
                     <a:srgbClr val="0070C0"/>
                   </a:solidFill>
+                  <a:latin typeface="Tw Cen MT" panose="020B0602020104020603" pitchFamily="34" charset="0"/>
                 </a:rPr>
                 <a:t>O</a:t>
               </a:r>
@@ -8075,10 +8083,10 @@
       </p:grpSp>
       <p:grpSp>
         <p:nvGrpSpPr>
-          <p:cNvPr id="3" name="Group 2">
+          <p:cNvPr id="7" name="Group 6">
             <a:extLst>
               <a:ext uri="{FF2B5EF4-FFF2-40B4-BE49-F238E27FC236}">
-                <a16:creationId xmlns:a16="http://schemas.microsoft.com/office/drawing/2014/main" id="{8EE74EFE-628C-4442-8817-B24E327B470D}"/>
+                <a16:creationId xmlns:a16="http://schemas.microsoft.com/office/drawing/2014/main" id="{D42B4A21-9DB0-4859-BDB2-0C0AD130D7CF}"/>
               </a:ext>
             </a:extLst>
           </p:cNvPr>
@@ -8087,10 +8095,10 @@
         </p:nvGrpSpPr>
         <p:grpSpPr>
           <a:xfrm>
-            <a:off x="6532742" y="4279209"/>
-            <a:ext cx="476094" cy="707886"/>
-            <a:chOff x="6532742" y="4279209"/>
-            <a:chExt cx="476094" cy="707886"/>
+            <a:off x="6510648" y="4273030"/>
+            <a:ext cx="488975" cy="707886"/>
+            <a:chOff x="6510648" y="4273030"/>
+            <a:chExt cx="488975" cy="707886"/>
           </a:xfrm>
         </p:grpSpPr>
         <p:grpSp>
@@ -8257,7 +8265,7 @@
           </p:nvSpPr>
           <p:spPr>
             <a:xfrm>
-              <a:off x="6532742" y="4279209"/>
+              <a:off x="6510648" y="4273030"/>
               <a:ext cx="476094" cy="707886"/>
             </a:xfrm>
             <a:prstGeom prst="rect">
@@ -8281,6 +8289,8 @@
                   <a:solidFill>
                     <a:srgbClr val="0070C0"/>
                   </a:solidFill>
+                  <a:latin typeface="Tw Cen MT" panose="020B0602020104020603" pitchFamily="34" charset="0"/>
+                  <a:cs typeface="Arial" panose="020B0604020202020204" pitchFamily="34" charset="0"/>
                 </a:rPr>
                 <a:t>O</a:t>
               </a:r>

</xml_diff>